<commit_message>
changed it a little
</commit_message>
<xml_diff>
--- a/Terr-out.pptx
+++ b/Terr-out.pptx
@@ -107,6 +107,11 @@
       </a:defRPr>
     </a:lvl9pPr>
   </p:defaultTextStyle>
+  <p:extLst>
+    <p:ext uri="{EFAFB233-063F-42B5-8137-9DF3F51BA10A}">
+      <p15:sldGuideLst xmlns:p15="http://schemas.microsoft.com/office/powerpoint/2012/main"/>
+    </p:ext>
+  </p:extLst>
 </p:presentation>
 </file>
 
@@ -3282,7 +3287,7 @@
         </p:blipFill>
         <p:spPr>
           <a:xfrm rot="5400000">
-            <a:off x="2669383" y="-2664617"/>
+            <a:off x="2669383" y="-2673511"/>
             <a:ext cx="6853234" cy="12192000"/>
           </a:xfrm>
         </p:spPr>
@@ -3309,7 +3314,7 @@
         </p:blipFill>
         <p:spPr>
           <a:xfrm>
-            <a:off x="709005" y="660118"/>
+            <a:off x="691367" y="3184240"/>
             <a:ext cx="5043466" cy="2337082"/>
           </a:xfrm>
           <a:prstGeom prst="rect">
@@ -3325,7 +3330,7 @@
         </p:nvSpPr>
         <p:spPr>
           <a:xfrm>
-            <a:off x="838200" y="3835400"/>
+            <a:off x="838200" y="546456"/>
             <a:ext cx="10858500" cy="2308324"/>
           </a:xfrm>
           <a:prstGeom prst="rect">
@@ -3443,7 +3448,7 @@
         </p:blipFill>
         <p:spPr>
           <a:xfrm>
-            <a:off x="6317621" y="628594"/>
+            <a:off x="6096000" y="3184240"/>
             <a:ext cx="4821806" cy="2368606"/>
           </a:xfrm>
           <a:prstGeom prst="rect">
@@ -3459,7 +3464,7 @@
         </p:nvSpPr>
         <p:spPr>
           <a:xfrm>
-            <a:off x="1135238" y="3031172"/>
+            <a:off x="1117600" y="5521322"/>
             <a:ext cx="4191000" cy="646331"/>
           </a:xfrm>
           <a:prstGeom prst="rect">
@@ -3529,7 +3534,7 @@
         </p:nvSpPr>
         <p:spPr>
           <a:xfrm>
-            <a:off x="6426200" y="3005772"/>
+            <a:off x="6096000" y="5554644"/>
             <a:ext cx="4821806" cy="646331"/>
           </a:xfrm>
           <a:prstGeom prst="rect">
@@ -4006,7 +4011,7 @@
         <p:spPr>
           <a:xfrm>
             <a:off x="355600" y="482600"/>
-            <a:ext cx="11455400" cy="3139321"/>
+            <a:ext cx="11455400" cy="2308324"/>
           </a:xfrm>
           <a:prstGeom prst="rect">
             <a:avLst/>
@@ -4061,64 +4066,6 @@
               </a:rPr>
               <a:t> to harm you and stop you from leaving. There are 2 types of traps one is the wall traps that when triggered press a wall to the other side of the hallway. And the other are floor spikes , which deal a constant amount a damage when triggered. </a:t>
             </a:r>
-          </a:p>
-          <a:p>
-            <a:endParaRPr lang="en-US" dirty="0">
-              <a:solidFill>
-                <a:schemeClr val="bg2"/>
-              </a:solidFill>
-            </a:endParaRPr>
-          </a:p>
-          <a:p>
-            <a:r>
-              <a:rPr lang="en-US" dirty="0" smtClean="0">
-                <a:solidFill>
-                  <a:schemeClr val="bg2"/>
-                </a:solidFill>
-              </a:rPr>
-              <a:t>Technology Used:</a:t>
-            </a:r>
-          </a:p>
-          <a:p>
-            <a:r>
-              <a:rPr lang="en-US" dirty="0">
-                <a:solidFill>
-                  <a:schemeClr val="bg2"/>
-                </a:solidFill>
-              </a:rPr>
-              <a:t>	</a:t>
-            </a:r>
-            <a:r>
-              <a:rPr lang="en-US" dirty="0" smtClean="0">
-                <a:solidFill>
-                  <a:schemeClr val="bg2"/>
-                </a:solidFill>
-              </a:rPr>
-              <a:t>	Unity 3d 4.3 and </a:t>
-            </a:r>
-            <a:r>
-              <a:rPr lang="en-US" dirty="0" err="1" smtClean="0">
-                <a:solidFill>
-                  <a:schemeClr val="bg2"/>
-                </a:solidFill>
-              </a:rPr>
-              <a:t>github</a:t>
-            </a:r>
-            <a:r>
-              <a:rPr lang="en-US" dirty="0" smtClean="0">
-                <a:solidFill>
-                  <a:schemeClr val="bg2"/>
-                </a:solidFill>
-              </a:rPr>
-              <a:t>,  address </a:t>
-            </a:r>
-            <a:r>
-              <a:rPr lang="en-US" dirty="0" smtClean="0">
-                <a:hlinkClick r:id="rId3"/>
-              </a:rPr>
-              <a:t>https://github.com/jacobdeichert/HorrorGame.git</a:t>
-            </a:r>
-            <a:endParaRPr lang="en-US" dirty="0" smtClean="0"/>
           </a:p>
           <a:p>
             <a:endParaRPr lang="en-US" dirty="0"/>
@@ -4137,7 +4084,7 @@
           <p:nvPr/>
         </p:nvPicPr>
         <p:blipFill>
-          <a:blip r:embed="rId4">
+          <a:blip r:embed="rId3">
             <a:extLst>
               <a:ext uri="{28A0092B-C50C-407E-A947-70E740481C1C}">
                 <a14:useLocalDpi xmlns:a14="http://schemas.microsoft.com/office/drawing/2010/main" val="0"/>
@@ -4150,7 +4097,7 @@
         </p:blipFill>
         <p:spPr>
           <a:xfrm>
-            <a:off x="355600" y="3048000"/>
+            <a:off x="444500" y="2489200"/>
             <a:ext cx="4749800" cy="3810000"/>
           </a:xfrm>
           <a:prstGeom prst="rect">
@@ -4166,7 +4113,7 @@
         </p:nvSpPr>
         <p:spPr>
           <a:xfrm>
-            <a:off x="5105400" y="3621921"/>
+            <a:off x="5638800" y="2396361"/>
             <a:ext cx="4356100" cy="1754326"/>
           </a:xfrm>
           <a:prstGeom prst="rect">
@@ -4223,6 +4170,85 @@
                 <a:schemeClr val="bg2"/>
               </a:solidFill>
             </a:endParaRPr>
+          </a:p>
+        </p:txBody>
+      </p:sp>
+      <p:sp>
+        <p:nvSpPr>
+          <p:cNvPr id="3" name="TextBox 2"/>
+          <p:cNvSpPr txBox="1"/>
+          <p:nvPr/>
+        </p:nvSpPr>
+        <p:spPr>
+          <a:xfrm>
+            <a:off x="5753100" y="4394200"/>
+            <a:ext cx="5930900" cy="923330"/>
+          </a:xfrm>
+          <a:prstGeom prst="rect">
+            <a:avLst/>
+          </a:prstGeom>
+          <a:noFill/>
+        </p:spPr>
+        <p:txBody>
+          <a:bodyPr wrap="square" rtlCol="0">
+            <a:spAutoFit/>
+          </a:bodyPr>
+          <a:lstStyle/>
+          <a:p>
+            <a:endParaRPr lang="en-US" dirty="0">
+              <a:solidFill>
+                <a:schemeClr val="bg2"/>
+              </a:solidFill>
+            </a:endParaRPr>
+          </a:p>
+          <a:p>
+            <a:r>
+              <a:rPr lang="en-US" dirty="0">
+                <a:solidFill>
+                  <a:schemeClr val="bg2"/>
+                </a:solidFill>
+              </a:rPr>
+              <a:t>Technology </a:t>
+            </a:r>
+            <a:r>
+              <a:rPr lang="en-US" smtClean="0">
+                <a:solidFill>
+                  <a:schemeClr val="bg2"/>
+                </a:solidFill>
+              </a:rPr>
+              <a:t>Used: Unity </a:t>
+            </a:r>
+            <a:r>
+              <a:rPr lang="en-US" dirty="0">
+                <a:solidFill>
+                  <a:schemeClr val="bg2"/>
+                </a:solidFill>
+              </a:rPr>
+              <a:t>3d 4.3 and </a:t>
+            </a:r>
+            <a:r>
+              <a:rPr lang="en-US" dirty="0" err="1">
+                <a:solidFill>
+                  <a:schemeClr val="bg2"/>
+                </a:solidFill>
+              </a:rPr>
+              <a:t>github</a:t>
+            </a:r>
+            <a:r>
+              <a:rPr lang="en-US" dirty="0">
+                <a:solidFill>
+                  <a:schemeClr val="bg2"/>
+                </a:solidFill>
+              </a:rPr>
+              <a:t>,  address </a:t>
+            </a:r>
+            <a:r>
+              <a:rPr lang="en-US" dirty="0">
+                <a:hlinkClick r:id="rId4"/>
+              </a:rPr>
+              <a:t>https://github.com/jacobdeichert/HorrorGame.git</a:t>
+            </a:r>
+            <a:endParaRPr lang="en-US" dirty="0"/>
           </a:p>
         </p:txBody>
       </p:sp>

</xml_diff>